<commit_message>
Add contents for my report
</commit_message>
<xml_diff>
--- a/project/期末專案企劃_應耀德_GPU購物小幫手_B2C_report_security.pptx
+++ b/project/期末專案企劃_應耀德_GPU購物小幫手_B2C_report_security.pptx
@@ -6,6 +6,13 @@
   </p:sldMasterIdLst>
   <p:sldIdLst>
     <p:sldId id="256" r:id="rId2"/>
+    <p:sldId id="257" r:id="rId3"/>
+    <p:sldId id="258" r:id="rId4"/>
+    <p:sldId id="259" r:id="rId5"/>
+    <p:sldId id="260" r:id="rId6"/>
+    <p:sldId id="261" r:id="rId7"/>
+    <p:sldId id="262" r:id="rId8"/>
+    <p:sldId id="263" r:id="rId9"/>
   </p:sldIdLst>
   <p:sldSz cx="12192000" cy="6858000"/>
   <p:notesSz cx="6858000" cy="9144000"/>
@@ -104,6 +111,11 @@
       </a:defRPr>
     </a:lvl9pPr>
   </p:defaultTextStyle>
+  <p:extLst>
+    <p:ext uri="{EFAFB233-063F-42B5-8137-9DF3F51BA10A}">
+      <p15:sldGuideLst xmlns:p15="http://schemas.microsoft.com/office/powerpoint/2012/main"/>
+    </p:ext>
+  </p:extLst>
 </p:presentation>
 </file>
 
@@ -2809,10 +2821,10 @@
           <a:lstStyle/>
           <a:p>
             <a:r>
-              <a:rPr lang="en-US"/>
+              <a:rPr lang="en-US" dirty="0"/>
               <a:t>Click to edit Master title style</a:t>
             </a:r>
-            <a:endParaRPr lang="en-TW"/>
+            <a:endParaRPr lang="en-TW" dirty="0"/>
           </a:p>
         </p:txBody>
       </p:sp>
@@ -2919,12 +2931,15 @@
                     <a:tint val="75000"/>
                   </a:schemeClr>
                 </a:solidFill>
+                <a:latin typeface="Times New Roman" panose="02020603050405020304" pitchFamily="18" charset="0"/>
+                <a:cs typeface="Times New Roman" panose="02020603050405020304" pitchFamily="18" charset="0"/>
               </a:defRPr>
             </a:lvl1pPr>
           </a:lstStyle>
           <a:p>
             <a:fld id="{2869FA3D-D031-B64E-8D91-959593723A16}" type="datetimeFigureOut">
               <a:rPr lang="en-TW" smtClean="0"/>
+              <a:pPr/>
               <a:t>2022/1/1</a:t>
             </a:fld>
             <a:endParaRPr lang="en-TW"/>
@@ -2966,6 +2981,8 @@
                     <a:tint val="75000"/>
                   </a:schemeClr>
                 </a:solidFill>
+                <a:latin typeface="Times New Roman" panose="02020603050405020304" pitchFamily="18" charset="0"/>
+                <a:cs typeface="Times New Roman" panose="02020603050405020304" pitchFamily="18" charset="0"/>
               </a:defRPr>
             </a:lvl1pPr>
           </a:lstStyle>
@@ -3009,12 +3026,15 @@
                     <a:tint val="75000"/>
                   </a:schemeClr>
                 </a:solidFill>
+                <a:latin typeface="Times New Roman" panose="02020603050405020304" pitchFamily="18" charset="0"/>
+                <a:cs typeface="Times New Roman" panose="02020603050405020304" pitchFamily="18" charset="0"/>
               </a:defRPr>
             </a:lvl1pPr>
           </a:lstStyle>
           <a:p>
             <a:fld id="{2705B781-1FEB-5541-9E52-E7C01F4AB4AF}" type="slidenum">
               <a:rPr lang="en-TW" smtClean="0"/>
+              <a:pPr/>
               <a:t>‹#›</a:t>
             </a:fld>
             <a:endParaRPr lang="en-TW"/>
@@ -3056,9 +3076,9 @@
           <a:solidFill>
             <a:schemeClr val="tx1"/>
           </a:solidFill>
-          <a:latin typeface="+mj-lt"/>
+          <a:latin typeface="Times New Roman" panose="02020603050405020304" pitchFamily="18" charset="0"/>
           <a:ea typeface="+mj-ea"/>
-          <a:cs typeface="+mj-cs"/>
+          <a:cs typeface="Times New Roman" panose="02020603050405020304" pitchFamily="18" charset="0"/>
         </a:defRPr>
       </a:lvl1pPr>
     </p:titleStyle>
@@ -3076,9 +3096,9 @@
           <a:solidFill>
             <a:schemeClr val="tx1"/>
           </a:solidFill>
-          <a:latin typeface="+mn-lt"/>
+          <a:latin typeface="Times New Roman" panose="02020603050405020304" pitchFamily="18" charset="0"/>
           <a:ea typeface="+mn-ea"/>
-          <a:cs typeface="+mn-cs"/>
+          <a:cs typeface="Times New Roman" panose="02020603050405020304" pitchFamily="18" charset="0"/>
         </a:defRPr>
       </a:lvl1pPr>
       <a:lvl2pPr marL="685800" indent="-228600" algn="l" defTabSz="914400" rtl="0" eaLnBrk="1" latinLnBrk="0" hangingPunct="1">
@@ -3094,9 +3114,9 @@
           <a:solidFill>
             <a:schemeClr val="tx1"/>
           </a:solidFill>
-          <a:latin typeface="+mn-lt"/>
+          <a:latin typeface="Times New Roman" panose="02020603050405020304" pitchFamily="18" charset="0"/>
           <a:ea typeface="+mn-ea"/>
-          <a:cs typeface="+mn-cs"/>
+          <a:cs typeface="Times New Roman" panose="02020603050405020304" pitchFamily="18" charset="0"/>
         </a:defRPr>
       </a:lvl2pPr>
       <a:lvl3pPr marL="1143000" indent="-228600" algn="l" defTabSz="914400" rtl="0" eaLnBrk="1" latinLnBrk="0" hangingPunct="1">
@@ -3112,9 +3132,9 @@
           <a:solidFill>
             <a:schemeClr val="tx1"/>
           </a:solidFill>
-          <a:latin typeface="+mn-lt"/>
+          <a:latin typeface="Times New Roman" panose="02020603050405020304" pitchFamily="18" charset="0"/>
           <a:ea typeface="+mn-ea"/>
-          <a:cs typeface="+mn-cs"/>
+          <a:cs typeface="Times New Roman" panose="02020603050405020304" pitchFamily="18" charset="0"/>
         </a:defRPr>
       </a:lvl3pPr>
       <a:lvl4pPr marL="1600200" indent="-228600" algn="l" defTabSz="914400" rtl="0" eaLnBrk="1" latinLnBrk="0" hangingPunct="1">
@@ -3130,9 +3150,9 @@
           <a:solidFill>
             <a:schemeClr val="tx1"/>
           </a:solidFill>
-          <a:latin typeface="+mn-lt"/>
+          <a:latin typeface="Times New Roman" panose="02020603050405020304" pitchFamily="18" charset="0"/>
           <a:ea typeface="+mn-ea"/>
-          <a:cs typeface="+mn-cs"/>
+          <a:cs typeface="Times New Roman" panose="02020603050405020304" pitchFamily="18" charset="0"/>
         </a:defRPr>
       </a:lvl4pPr>
       <a:lvl5pPr marL="2057400" indent="-228600" algn="l" defTabSz="914400" rtl="0" eaLnBrk="1" latinLnBrk="0" hangingPunct="1">
@@ -3148,9 +3168,9 @@
           <a:solidFill>
             <a:schemeClr val="tx1"/>
           </a:solidFill>
-          <a:latin typeface="+mn-lt"/>
+          <a:latin typeface="Times New Roman" panose="02020603050405020304" pitchFamily="18" charset="0"/>
           <a:ea typeface="+mn-ea"/>
-          <a:cs typeface="+mn-cs"/>
+          <a:cs typeface="Times New Roman" panose="02020603050405020304" pitchFamily="18" charset="0"/>
         </a:defRPr>
       </a:lvl5pPr>
       <a:lvl6pPr marL="2514600" indent="-228600" algn="l" defTabSz="914400" rtl="0" eaLnBrk="1" latinLnBrk="0" hangingPunct="1">
@@ -3363,7 +3383,26 @@
           <a:bodyPr/>
           <a:lstStyle/>
           <a:p>
-            <a:endParaRPr lang="en-TW"/>
+            <a:r>
+              <a:rPr lang="en-TW" dirty="0">
+                <a:ea typeface="DFKai-SB" panose="03000509000000000000" pitchFamily="49" charset="-120"/>
+              </a:rPr>
+              <a:t>GPU</a:t>
+            </a:r>
+            <a:r>
+              <a:rPr lang="zh-TW" altLang="en-US" dirty="0">
+                <a:ea typeface="DFKai-SB" panose="03000509000000000000" pitchFamily="49" charset="-120"/>
+              </a:rPr>
+              <a:t> </a:t>
+            </a:r>
+            <a:r>
+              <a:rPr lang="en-TW" dirty="0">
+                <a:latin typeface="DFKai-SB" panose="03000509000000000000" pitchFamily="49" charset="-120"/>
+                <a:ea typeface="DFKai-SB" panose="03000509000000000000" pitchFamily="49" charset="-120"/>
+                <a:cs typeface="DFKai-SB" panose="03000509000000000000" pitchFamily="49" charset="-120"/>
+              </a:rPr>
+              <a:t>購物小幫手</a:t>
+            </a:r>
           </a:p>
         </p:txBody>
       </p:sp>
@@ -3385,10 +3424,97 @@
         </p:nvSpPr>
         <p:spPr/>
         <p:txBody>
-          <a:bodyPr/>
-          <a:lstStyle/>
-          <a:p>
-            <a:endParaRPr lang="en-TW"/>
+          <a:bodyPr>
+            <a:normAutofit lnSpcReduction="10000"/>
+          </a:bodyPr>
+          <a:lstStyle/>
+          <a:p>
+            <a:r>
+              <a:rPr lang="en-US" altLang="zh-TW" dirty="0">
+                <a:ea typeface="DFKai-SB" panose="03000509000000000000" pitchFamily="49" charset="-120"/>
+              </a:rPr>
+              <a:t>B2C Website </a:t>
+            </a:r>
+            <a:r>
+              <a:rPr lang="zh-TW" altLang="en-US" dirty="0">
+                <a:ea typeface="DFKai-SB" panose="03000509000000000000" pitchFamily="49" charset="-120"/>
+              </a:rPr>
+              <a:t>與</a:t>
+            </a:r>
+            <a:r>
+              <a:rPr lang="en-US" altLang="zh-TW" dirty="0">
+                <a:ea typeface="DFKai-SB" panose="03000509000000000000" pitchFamily="49" charset="-120"/>
+              </a:rPr>
+              <a:t> Report Security</a:t>
+            </a:r>
+          </a:p>
+          <a:p>
+            <a:endParaRPr lang="en-US" altLang="zh-TW" dirty="0">
+              <a:ea typeface="DFKai-SB" panose="03000509000000000000" pitchFamily="49" charset="-120"/>
+            </a:endParaRPr>
+          </a:p>
+          <a:p>
+            <a:r>
+              <a:rPr lang="zh-TW" altLang="en-US" dirty="0">
+                <a:ea typeface="DFKai-SB" panose="03000509000000000000" pitchFamily="49" charset="-120"/>
+              </a:rPr>
+              <a:t>資工四 </a:t>
+            </a:r>
+            <a:r>
+              <a:rPr lang="en-US" altLang="zh-TW" dirty="0">
+                <a:ea typeface="DFKai-SB" panose="03000509000000000000" pitchFamily="49" charset="-120"/>
+              </a:rPr>
+              <a:t>107590037 </a:t>
+            </a:r>
+            <a:r>
+              <a:rPr lang="zh-TW" altLang="en-US" dirty="0">
+                <a:ea typeface="DFKai-SB" panose="03000509000000000000" pitchFamily="49" charset="-120"/>
+              </a:rPr>
+              <a:t>應耀德</a:t>
+            </a:r>
+            <a:r>
+              <a:rPr lang="en-US" altLang="zh-TW" dirty="0">
+                <a:ea typeface="DFKai-SB" panose="03000509000000000000" pitchFamily="49" charset="-120"/>
+              </a:rPr>
+              <a:t> (</a:t>
+            </a:r>
+            <a:r>
+              <a:rPr lang="zh-TW" altLang="en-US" dirty="0">
+                <a:ea typeface="DFKai-SB" panose="03000509000000000000" pitchFamily="49" charset="-120"/>
+              </a:rPr>
+              <a:t>主講人</a:t>
+            </a:r>
+            <a:r>
+              <a:rPr lang="en-US" altLang="zh-TW" dirty="0">
+                <a:ea typeface="DFKai-SB" panose="03000509000000000000" pitchFamily="49" charset="-120"/>
+              </a:rPr>
+              <a:t>)</a:t>
+            </a:r>
+          </a:p>
+          <a:p>
+            <a:r>
+              <a:rPr lang="zh-TW" altLang="en-US" dirty="0">
+                <a:ea typeface="DFKai-SB" panose="03000509000000000000" pitchFamily="49" charset="-120"/>
+              </a:rPr>
+              <a:t>資工四 </a:t>
+            </a:r>
+            <a:r>
+              <a:rPr lang="en-US" altLang="zh-TW" dirty="0">
+                <a:ea typeface="DFKai-SB" panose="03000509000000000000" pitchFamily="49" charset="-120"/>
+              </a:rPr>
+              <a:t>107590012 </a:t>
+            </a:r>
+            <a:r>
+              <a:rPr lang="zh-TW" altLang="en-US" dirty="0">
+                <a:ea typeface="DFKai-SB" panose="03000509000000000000" pitchFamily="49" charset="-120"/>
+              </a:rPr>
+              <a:t>陳志榮</a:t>
+            </a:r>
+          </a:p>
+          <a:p>
+            <a:endParaRPr lang="zh-TW" altLang="en-US" dirty="0">
+              <a:ea typeface="DFKai-SB" panose="03000509000000000000" pitchFamily="49" charset="-120"/>
+            </a:endParaRPr>
           </a:p>
         </p:txBody>
       </p:sp>
@@ -3396,6 +3522,684 @@
     <p:extLst>
       <p:ext uri="{BB962C8B-B14F-4D97-AF65-F5344CB8AC3E}">
         <p14:creationId xmlns:p14="http://schemas.microsoft.com/office/powerpoint/2010/main" val="4092676991"/>
+      </p:ext>
+    </p:extLst>
+  </p:cSld>
+  <p:clrMapOvr>
+    <a:masterClrMapping/>
+  </p:clrMapOvr>
+</p:sld>
+</file>
+
+<file path=ppt/slides/slide2.xml><?xml version="1.0" encoding="utf-8"?>
+<p:sld xmlns:a="http://schemas.openxmlformats.org/drawingml/2006/main" xmlns:r="http://schemas.openxmlformats.org/officeDocument/2006/relationships" xmlns:p="http://schemas.openxmlformats.org/presentationml/2006/main">
+  <p:cSld>
+    <p:spTree>
+      <p:nvGrpSpPr>
+        <p:cNvPr id="1" name=""/>
+        <p:cNvGrpSpPr/>
+        <p:nvPr/>
+      </p:nvGrpSpPr>
+      <p:grpSpPr>
+        <a:xfrm>
+          <a:off x="0" y="0"/>
+          <a:ext cx="0" cy="0"/>
+          <a:chOff x="0" y="0"/>
+          <a:chExt cx="0" cy="0"/>
+        </a:xfrm>
+      </p:grpSpPr>
+      <p:sp>
+        <p:nvSpPr>
+          <p:cNvPr id="2" name="Title 1">
+            <a:extLst>
+              <a:ext uri="{FF2B5EF4-FFF2-40B4-BE49-F238E27FC236}">
+                <a16:creationId xmlns:a16="http://schemas.microsoft.com/office/drawing/2014/main" id="{A4899FD3-E1CC-C944-B8AE-16B8A1B5F1B6}"/>
+              </a:ext>
+            </a:extLst>
+          </p:cNvPr>
+          <p:cNvSpPr>
+            <a:spLocks noGrp="1"/>
+          </p:cNvSpPr>
+          <p:nvPr>
+            <p:ph type="title"/>
+          </p:nvPr>
+        </p:nvSpPr>
+        <p:spPr/>
+        <p:txBody>
+          <a:bodyPr/>
+          <a:lstStyle/>
+          <a:p>
+            <a:r>
+              <a:rPr lang="en-US" dirty="0">
+                <a:ea typeface="DFKai-SB" panose="03000509000000000000" pitchFamily="49" charset="-120"/>
+              </a:rPr>
+              <a:t>Open Data </a:t>
+            </a:r>
+            <a:r>
+              <a:rPr lang="zh-TW" altLang="en-US" dirty="0">
+                <a:ea typeface="DFKai-SB" panose="03000509000000000000" pitchFamily="49" charset="-120"/>
+              </a:rPr>
+              <a:t>開放資料服務 功能設計</a:t>
+            </a:r>
+            <a:endParaRPr lang="en-TW" dirty="0">
+              <a:ea typeface="DFKai-SB" panose="03000509000000000000" pitchFamily="49" charset="-120"/>
+            </a:endParaRPr>
+          </a:p>
+        </p:txBody>
+      </p:sp>
+      <p:sp>
+        <p:nvSpPr>
+          <p:cNvPr id="3" name="Content Placeholder 2">
+            <a:extLst>
+              <a:ext uri="{FF2B5EF4-FFF2-40B4-BE49-F238E27FC236}">
+                <a16:creationId xmlns:a16="http://schemas.microsoft.com/office/drawing/2014/main" id="{D0015E2B-A1CC-6447-9536-C7CF704646DA}"/>
+              </a:ext>
+            </a:extLst>
+          </p:cNvPr>
+          <p:cNvSpPr>
+            <a:spLocks noGrp="1"/>
+          </p:cNvSpPr>
+          <p:nvPr>
+            <p:ph idx="1"/>
+          </p:nvPr>
+        </p:nvSpPr>
+        <p:spPr/>
+        <p:txBody>
+          <a:bodyPr/>
+          <a:lstStyle/>
+          <a:p>
+            <a:endParaRPr lang="en-TW" dirty="0"/>
+          </a:p>
+        </p:txBody>
+      </p:sp>
+    </p:spTree>
+    <p:extLst>
+      <p:ext uri="{BB962C8B-B14F-4D97-AF65-F5344CB8AC3E}">
+        <p14:creationId xmlns:p14="http://schemas.microsoft.com/office/powerpoint/2010/main" val="1603443445"/>
+      </p:ext>
+    </p:extLst>
+  </p:cSld>
+  <p:clrMapOvr>
+    <a:masterClrMapping/>
+  </p:clrMapOvr>
+</p:sld>
+</file>
+
+<file path=ppt/slides/slide3.xml><?xml version="1.0" encoding="utf-8"?>
+<p:sld xmlns:a="http://schemas.openxmlformats.org/drawingml/2006/main" xmlns:r="http://schemas.openxmlformats.org/officeDocument/2006/relationships" xmlns:p="http://schemas.openxmlformats.org/presentationml/2006/main">
+  <p:cSld>
+    <p:spTree>
+      <p:nvGrpSpPr>
+        <p:cNvPr id="1" name=""/>
+        <p:cNvGrpSpPr/>
+        <p:nvPr/>
+      </p:nvGrpSpPr>
+      <p:grpSpPr>
+        <a:xfrm>
+          <a:off x="0" y="0"/>
+          <a:ext cx="0" cy="0"/>
+          <a:chOff x="0" y="0"/>
+          <a:chExt cx="0" cy="0"/>
+        </a:xfrm>
+      </p:grpSpPr>
+      <p:sp>
+        <p:nvSpPr>
+          <p:cNvPr id="2" name="Title 1">
+            <a:extLst>
+              <a:ext uri="{FF2B5EF4-FFF2-40B4-BE49-F238E27FC236}">
+                <a16:creationId xmlns:a16="http://schemas.microsoft.com/office/drawing/2014/main" id="{A4899FD3-E1CC-C944-B8AE-16B8A1B5F1B6}"/>
+              </a:ext>
+            </a:extLst>
+          </p:cNvPr>
+          <p:cNvSpPr>
+            <a:spLocks noGrp="1"/>
+          </p:cNvSpPr>
+          <p:nvPr>
+            <p:ph type="title"/>
+          </p:nvPr>
+        </p:nvSpPr>
+        <p:spPr/>
+        <p:txBody>
+          <a:bodyPr/>
+          <a:lstStyle/>
+          <a:p>
+            <a:r>
+              <a:rPr lang="en-US" dirty="0">
+                <a:ea typeface="DFKai-SB" panose="03000509000000000000" pitchFamily="49" charset="-120"/>
+              </a:rPr>
+              <a:t>B2C Website </a:t>
+            </a:r>
+            <a:r>
+              <a:rPr lang="zh-TW" altLang="en-US" dirty="0">
+                <a:ea typeface="DFKai-SB" panose="03000509000000000000" pitchFamily="49" charset="-120"/>
+              </a:rPr>
+              <a:t>網站功能設計</a:t>
+            </a:r>
+            <a:endParaRPr lang="en-TW" dirty="0">
+              <a:ea typeface="DFKai-SB" panose="03000509000000000000" pitchFamily="49" charset="-120"/>
+            </a:endParaRPr>
+          </a:p>
+        </p:txBody>
+      </p:sp>
+      <p:sp>
+        <p:nvSpPr>
+          <p:cNvPr id="3" name="Content Placeholder 2">
+            <a:extLst>
+              <a:ext uri="{FF2B5EF4-FFF2-40B4-BE49-F238E27FC236}">
+                <a16:creationId xmlns:a16="http://schemas.microsoft.com/office/drawing/2014/main" id="{D0015E2B-A1CC-6447-9536-C7CF704646DA}"/>
+              </a:ext>
+            </a:extLst>
+          </p:cNvPr>
+          <p:cNvSpPr>
+            <a:spLocks noGrp="1"/>
+          </p:cNvSpPr>
+          <p:nvPr>
+            <p:ph idx="1"/>
+          </p:nvPr>
+        </p:nvSpPr>
+        <p:spPr/>
+        <p:txBody>
+          <a:bodyPr/>
+          <a:lstStyle/>
+          <a:p>
+            <a:endParaRPr lang="en-TW" dirty="0"/>
+          </a:p>
+        </p:txBody>
+      </p:sp>
+    </p:spTree>
+    <p:extLst>
+      <p:ext uri="{BB962C8B-B14F-4D97-AF65-F5344CB8AC3E}">
+        <p14:creationId xmlns:p14="http://schemas.microsoft.com/office/powerpoint/2010/main" val="1593142362"/>
+      </p:ext>
+    </p:extLst>
+  </p:cSld>
+  <p:clrMapOvr>
+    <a:masterClrMapping/>
+  </p:clrMapOvr>
+</p:sld>
+</file>
+
+<file path=ppt/slides/slide4.xml><?xml version="1.0" encoding="utf-8"?>
+<p:sld xmlns:a="http://schemas.openxmlformats.org/drawingml/2006/main" xmlns:r="http://schemas.openxmlformats.org/officeDocument/2006/relationships" xmlns:p="http://schemas.openxmlformats.org/presentationml/2006/main">
+  <p:cSld>
+    <p:spTree>
+      <p:nvGrpSpPr>
+        <p:cNvPr id="1" name=""/>
+        <p:cNvGrpSpPr/>
+        <p:nvPr/>
+      </p:nvGrpSpPr>
+      <p:grpSpPr>
+        <a:xfrm>
+          <a:off x="0" y="0"/>
+          <a:ext cx="0" cy="0"/>
+          <a:chOff x="0" y="0"/>
+          <a:chExt cx="0" cy="0"/>
+        </a:xfrm>
+      </p:grpSpPr>
+      <p:sp>
+        <p:nvSpPr>
+          <p:cNvPr id="2" name="Title 1">
+            <a:extLst>
+              <a:ext uri="{FF2B5EF4-FFF2-40B4-BE49-F238E27FC236}">
+                <a16:creationId xmlns:a16="http://schemas.microsoft.com/office/drawing/2014/main" id="{A4899FD3-E1CC-C944-B8AE-16B8A1B5F1B6}"/>
+              </a:ext>
+            </a:extLst>
+          </p:cNvPr>
+          <p:cNvSpPr>
+            <a:spLocks noGrp="1"/>
+          </p:cNvSpPr>
+          <p:nvPr>
+            <p:ph type="title"/>
+          </p:nvPr>
+        </p:nvSpPr>
+        <p:spPr/>
+        <p:txBody>
+          <a:bodyPr/>
+          <a:lstStyle/>
+          <a:p>
+            <a:r>
+              <a:rPr lang="zh-TW" altLang="en-US" dirty="0">
+                <a:ea typeface="DFKai-SB" panose="03000509000000000000" pitchFamily="49" charset="-120"/>
+              </a:rPr>
+              <a:t>系統架構圖</a:t>
+            </a:r>
+            <a:r>
+              <a:rPr lang="en-US" altLang="zh-TW" dirty="0">
+                <a:ea typeface="DFKai-SB" panose="03000509000000000000" pitchFamily="49" charset="-120"/>
+              </a:rPr>
+              <a:t> - B2C Website</a:t>
+            </a:r>
+            <a:endParaRPr lang="en-TW" dirty="0">
+              <a:ea typeface="DFKai-SB" panose="03000509000000000000" pitchFamily="49" charset="-120"/>
+            </a:endParaRPr>
+          </a:p>
+        </p:txBody>
+      </p:sp>
+      <p:sp>
+        <p:nvSpPr>
+          <p:cNvPr id="3" name="Content Placeholder 2">
+            <a:extLst>
+              <a:ext uri="{FF2B5EF4-FFF2-40B4-BE49-F238E27FC236}">
+                <a16:creationId xmlns:a16="http://schemas.microsoft.com/office/drawing/2014/main" id="{D0015E2B-A1CC-6447-9536-C7CF704646DA}"/>
+              </a:ext>
+            </a:extLst>
+          </p:cNvPr>
+          <p:cNvSpPr>
+            <a:spLocks noGrp="1"/>
+          </p:cNvSpPr>
+          <p:nvPr>
+            <p:ph idx="1"/>
+          </p:nvPr>
+        </p:nvSpPr>
+        <p:spPr/>
+        <p:txBody>
+          <a:bodyPr/>
+          <a:lstStyle/>
+          <a:p>
+            <a:endParaRPr lang="en-TW" dirty="0"/>
+          </a:p>
+        </p:txBody>
+      </p:sp>
+    </p:spTree>
+    <p:extLst>
+      <p:ext uri="{BB962C8B-B14F-4D97-AF65-F5344CB8AC3E}">
+        <p14:creationId xmlns:p14="http://schemas.microsoft.com/office/powerpoint/2010/main" val="4073372853"/>
+      </p:ext>
+    </p:extLst>
+  </p:cSld>
+  <p:clrMapOvr>
+    <a:masterClrMapping/>
+  </p:clrMapOvr>
+</p:sld>
+</file>
+
+<file path=ppt/slides/slide5.xml><?xml version="1.0" encoding="utf-8"?>
+<p:sld xmlns:a="http://schemas.openxmlformats.org/drawingml/2006/main" xmlns:r="http://schemas.openxmlformats.org/officeDocument/2006/relationships" xmlns:p="http://schemas.openxmlformats.org/presentationml/2006/main">
+  <p:cSld>
+    <p:spTree>
+      <p:nvGrpSpPr>
+        <p:cNvPr id="1" name=""/>
+        <p:cNvGrpSpPr/>
+        <p:nvPr/>
+      </p:nvGrpSpPr>
+      <p:grpSpPr>
+        <a:xfrm>
+          <a:off x="0" y="0"/>
+          <a:ext cx="0" cy="0"/>
+          <a:chOff x="0" y="0"/>
+          <a:chExt cx="0" cy="0"/>
+        </a:xfrm>
+      </p:grpSpPr>
+      <p:sp>
+        <p:nvSpPr>
+          <p:cNvPr id="2" name="Title 1">
+            <a:extLst>
+              <a:ext uri="{FF2B5EF4-FFF2-40B4-BE49-F238E27FC236}">
+                <a16:creationId xmlns:a16="http://schemas.microsoft.com/office/drawing/2014/main" id="{A4899FD3-E1CC-C944-B8AE-16B8A1B5F1B6}"/>
+              </a:ext>
+            </a:extLst>
+          </p:cNvPr>
+          <p:cNvSpPr>
+            <a:spLocks noGrp="1"/>
+          </p:cNvSpPr>
+          <p:nvPr>
+            <p:ph type="title"/>
+          </p:nvPr>
+        </p:nvSpPr>
+        <p:spPr/>
+        <p:txBody>
+          <a:bodyPr/>
+          <a:lstStyle/>
+          <a:p>
+            <a:r>
+              <a:rPr lang="en-US" altLang="zh-TW" dirty="0">
+                <a:ea typeface="DFKai-SB" panose="03000509000000000000" pitchFamily="49" charset="-120"/>
+              </a:rPr>
+              <a:t>Website </a:t>
+            </a:r>
+            <a:r>
+              <a:rPr lang="zh-TW" altLang="en-US" dirty="0">
+                <a:ea typeface="DFKai-SB" panose="03000509000000000000" pitchFamily="49" charset="-120"/>
+              </a:rPr>
+              <a:t>會員資料模型設計</a:t>
+            </a:r>
+            <a:endParaRPr lang="en-TW" dirty="0">
+              <a:ea typeface="DFKai-SB" panose="03000509000000000000" pitchFamily="49" charset="-120"/>
+            </a:endParaRPr>
+          </a:p>
+        </p:txBody>
+      </p:sp>
+      <p:sp>
+        <p:nvSpPr>
+          <p:cNvPr id="3" name="Content Placeholder 2">
+            <a:extLst>
+              <a:ext uri="{FF2B5EF4-FFF2-40B4-BE49-F238E27FC236}">
+                <a16:creationId xmlns:a16="http://schemas.microsoft.com/office/drawing/2014/main" id="{D0015E2B-A1CC-6447-9536-C7CF704646DA}"/>
+              </a:ext>
+            </a:extLst>
+          </p:cNvPr>
+          <p:cNvSpPr>
+            <a:spLocks noGrp="1"/>
+          </p:cNvSpPr>
+          <p:nvPr>
+            <p:ph idx="1"/>
+          </p:nvPr>
+        </p:nvSpPr>
+        <p:spPr/>
+        <p:txBody>
+          <a:bodyPr/>
+          <a:lstStyle/>
+          <a:p>
+            <a:endParaRPr lang="en-TW" dirty="0"/>
+          </a:p>
+        </p:txBody>
+      </p:sp>
+    </p:spTree>
+    <p:extLst>
+      <p:ext uri="{BB962C8B-B14F-4D97-AF65-F5344CB8AC3E}">
+        <p14:creationId xmlns:p14="http://schemas.microsoft.com/office/powerpoint/2010/main" val="64906888"/>
+      </p:ext>
+    </p:extLst>
+  </p:cSld>
+  <p:clrMapOvr>
+    <a:masterClrMapping/>
+  </p:clrMapOvr>
+</p:sld>
+</file>
+
+<file path=ppt/slides/slide6.xml><?xml version="1.0" encoding="utf-8"?>
+<p:sld xmlns:a="http://schemas.openxmlformats.org/drawingml/2006/main" xmlns:r="http://schemas.openxmlformats.org/officeDocument/2006/relationships" xmlns:p="http://schemas.openxmlformats.org/presentationml/2006/main">
+  <p:cSld>
+    <p:spTree>
+      <p:nvGrpSpPr>
+        <p:cNvPr id="1" name=""/>
+        <p:cNvGrpSpPr/>
+        <p:nvPr/>
+      </p:nvGrpSpPr>
+      <p:grpSpPr>
+        <a:xfrm>
+          <a:off x="0" y="0"/>
+          <a:ext cx="0" cy="0"/>
+          <a:chOff x="0" y="0"/>
+          <a:chExt cx="0" cy="0"/>
+        </a:xfrm>
+      </p:grpSpPr>
+      <p:sp>
+        <p:nvSpPr>
+          <p:cNvPr id="2" name="Title 1">
+            <a:extLst>
+              <a:ext uri="{FF2B5EF4-FFF2-40B4-BE49-F238E27FC236}">
+                <a16:creationId xmlns:a16="http://schemas.microsoft.com/office/drawing/2014/main" id="{A4899FD3-E1CC-C944-B8AE-16B8A1B5F1B6}"/>
+              </a:ext>
+            </a:extLst>
+          </p:cNvPr>
+          <p:cNvSpPr>
+            <a:spLocks noGrp="1"/>
+          </p:cNvSpPr>
+          <p:nvPr>
+            <p:ph type="title"/>
+          </p:nvPr>
+        </p:nvSpPr>
+        <p:spPr/>
+        <p:txBody>
+          <a:bodyPr/>
+          <a:lstStyle/>
+          <a:p>
+            <a:r>
+              <a:rPr lang="en-US" altLang="zh-TW" dirty="0">
+                <a:ea typeface="DFKai-SB" panose="03000509000000000000" pitchFamily="49" charset="-120"/>
+              </a:rPr>
+              <a:t>Website </a:t>
+            </a:r>
+            <a:r>
+              <a:rPr lang="zh-TW" altLang="en-US" dirty="0">
+                <a:ea typeface="DFKai-SB" panose="03000509000000000000" pitchFamily="49" charset="-120"/>
+              </a:rPr>
+              <a:t>認證授權</a:t>
+            </a:r>
+            <a:r>
+              <a:rPr lang="en-US" altLang="zh-TW" dirty="0">
+                <a:ea typeface="DFKai-SB" panose="03000509000000000000" pitchFamily="49" charset="-120"/>
+              </a:rPr>
+              <a:t> </a:t>
+            </a:r>
+            <a:r>
+              <a:rPr lang="zh-TW" altLang="en-US" dirty="0">
+                <a:ea typeface="DFKai-SB" panose="03000509000000000000" pitchFamily="49" charset="-120"/>
+              </a:rPr>
+              <a:t>整合測試規劃</a:t>
+            </a:r>
+            <a:endParaRPr lang="en-TW" dirty="0">
+              <a:ea typeface="DFKai-SB" panose="03000509000000000000" pitchFamily="49" charset="-120"/>
+            </a:endParaRPr>
+          </a:p>
+        </p:txBody>
+      </p:sp>
+      <p:sp>
+        <p:nvSpPr>
+          <p:cNvPr id="3" name="Content Placeholder 2">
+            <a:extLst>
+              <a:ext uri="{FF2B5EF4-FFF2-40B4-BE49-F238E27FC236}">
+                <a16:creationId xmlns:a16="http://schemas.microsoft.com/office/drawing/2014/main" id="{D0015E2B-A1CC-6447-9536-C7CF704646DA}"/>
+              </a:ext>
+            </a:extLst>
+          </p:cNvPr>
+          <p:cNvSpPr>
+            <a:spLocks noGrp="1"/>
+          </p:cNvSpPr>
+          <p:nvPr>
+            <p:ph idx="1"/>
+          </p:nvPr>
+        </p:nvSpPr>
+        <p:spPr/>
+        <p:txBody>
+          <a:bodyPr/>
+          <a:lstStyle/>
+          <a:p>
+            <a:endParaRPr lang="en-TW" dirty="0"/>
+          </a:p>
+        </p:txBody>
+      </p:sp>
+    </p:spTree>
+    <p:extLst>
+      <p:ext uri="{BB962C8B-B14F-4D97-AF65-F5344CB8AC3E}">
+        <p14:creationId xmlns:p14="http://schemas.microsoft.com/office/powerpoint/2010/main" val="3742035247"/>
+      </p:ext>
+    </p:extLst>
+  </p:cSld>
+  <p:clrMapOvr>
+    <a:masterClrMapping/>
+  </p:clrMapOvr>
+</p:sld>
+</file>
+
+<file path=ppt/slides/slide7.xml><?xml version="1.0" encoding="utf-8"?>
+<p:sld xmlns:a="http://schemas.openxmlformats.org/drawingml/2006/main" xmlns:r="http://schemas.openxmlformats.org/officeDocument/2006/relationships" xmlns:p="http://schemas.openxmlformats.org/presentationml/2006/main">
+  <p:cSld>
+    <p:spTree>
+      <p:nvGrpSpPr>
+        <p:cNvPr id="1" name=""/>
+        <p:cNvGrpSpPr/>
+        <p:nvPr/>
+      </p:nvGrpSpPr>
+      <p:grpSpPr>
+        <a:xfrm>
+          <a:off x="0" y="0"/>
+          <a:ext cx="0" cy="0"/>
+          <a:chOff x="0" y="0"/>
+          <a:chExt cx="0" cy="0"/>
+        </a:xfrm>
+      </p:grpSpPr>
+      <p:sp>
+        <p:nvSpPr>
+          <p:cNvPr id="2" name="Title 1">
+            <a:extLst>
+              <a:ext uri="{FF2B5EF4-FFF2-40B4-BE49-F238E27FC236}">
+                <a16:creationId xmlns:a16="http://schemas.microsoft.com/office/drawing/2014/main" id="{A4899FD3-E1CC-C944-B8AE-16B8A1B5F1B6}"/>
+              </a:ext>
+            </a:extLst>
+          </p:cNvPr>
+          <p:cNvSpPr>
+            <a:spLocks noGrp="1"/>
+          </p:cNvSpPr>
+          <p:nvPr>
+            <p:ph type="title"/>
+          </p:nvPr>
+        </p:nvSpPr>
+        <p:spPr/>
+        <p:txBody>
+          <a:bodyPr/>
+          <a:lstStyle/>
+          <a:p>
+            <a:r>
+              <a:rPr lang="en-US" dirty="0">
+                <a:ea typeface="DFKai-SB" panose="03000509000000000000" pitchFamily="49" charset="-120"/>
+              </a:rPr>
+              <a:t>Report 角色、</a:t>
+            </a:r>
+            <a:r>
+              <a:rPr lang="zh-TW" altLang="en-US" dirty="0">
+                <a:ea typeface="DFKai-SB" panose="03000509000000000000" pitchFamily="49" charset="-120"/>
+              </a:rPr>
+              <a:t>授權政策設計</a:t>
+            </a:r>
+            <a:endParaRPr lang="en-TW" dirty="0">
+              <a:ea typeface="DFKai-SB" panose="03000509000000000000" pitchFamily="49" charset="-120"/>
+            </a:endParaRPr>
+          </a:p>
+        </p:txBody>
+      </p:sp>
+      <p:sp>
+        <p:nvSpPr>
+          <p:cNvPr id="3" name="Content Placeholder 2">
+            <a:extLst>
+              <a:ext uri="{FF2B5EF4-FFF2-40B4-BE49-F238E27FC236}">
+                <a16:creationId xmlns:a16="http://schemas.microsoft.com/office/drawing/2014/main" id="{D0015E2B-A1CC-6447-9536-C7CF704646DA}"/>
+              </a:ext>
+            </a:extLst>
+          </p:cNvPr>
+          <p:cNvSpPr>
+            <a:spLocks noGrp="1"/>
+          </p:cNvSpPr>
+          <p:nvPr>
+            <p:ph idx="1"/>
+          </p:nvPr>
+        </p:nvSpPr>
+        <p:spPr/>
+        <p:txBody>
+          <a:bodyPr/>
+          <a:lstStyle/>
+          <a:p>
+            <a:endParaRPr lang="en-TW" dirty="0"/>
+          </a:p>
+        </p:txBody>
+      </p:sp>
+    </p:spTree>
+    <p:extLst>
+      <p:ext uri="{BB962C8B-B14F-4D97-AF65-F5344CB8AC3E}">
+        <p14:creationId xmlns:p14="http://schemas.microsoft.com/office/powerpoint/2010/main" val="4214567185"/>
+      </p:ext>
+    </p:extLst>
+  </p:cSld>
+  <p:clrMapOvr>
+    <a:masterClrMapping/>
+  </p:clrMapOvr>
+</p:sld>
+</file>
+
+<file path=ppt/slides/slide8.xml><?xml version="1.0" encoding="utf-8"?>
+<p:sld xmlns:a="http://schemas.openxmlformats.org/drawingml/2006/main" xmlns:r="http://schemas.openxmlformats.org/officeDocument/2006/relationships" xmlns:p="http://schemas.openxmlformats.org/presentationml/2006/main">
+  <p:cSld>
+    <p:spTree>
+      <p:nvGrpSpPr>
+        <p:cNvPr id="1" name=""/>
+        <p:cNvGrpSpPr/>
+        <p:nvPr/>
+      </p:nvGrpSpPr>
+      <p:grpSpPr>
+        <a:xfrm>
+          <a:off x="0" y="0"/>
+          <a:ext cx="0" cy="0"/>
+          <a:chOff x="0" y="0"/>
+          <a:chExt cx="0" cy="0"/>
+        </a:xfrm>
+      </p:grpSpPr>
+      <p:sp>
+        <p:nvSpPr>
+          <p:cNvPr id="2" name="Title 1">
+            <a:extLst>
+              <a:ext uri="{FF2B5EF4-FFF2-40B4-BE49-F238E27FC236}">
+                <a16:creationId xmlns:a16="http://schemas.microsoft.com/office/drawing/2014/main" id="{A4899FD3-E1CC-C944-B8AE-16B8A1B5F1B6}"/>
+              </a:ext>
+            </a:extLst>
+          </p:cNvPr>
+          <p:cNvSpPr>
+            <a:spLocks noGrp="1"/>
+          </p:cNvSpPr>
+          <p:nvPr>
+            <p:ph type="title"/>
+          </p:nvPr>
+        </p:nvSpPr>
+        <p:spPr/>
+        <p:txBody>
+          <a:bodyPr>
+            <a:normAutofit/>
+          </a:bodyPr>
+          <a:lstStyle/>
+          <a:p>
+            <a:r>
+              <a:rPr lang="en-US" dirty="0">
+                <a:ea typeface="DFKai-SB" panose="03000509000000000000" pitchFamily="49" charset="-120"/>
+              </a:rPr>
+              <a:t>Report </a:t>
+            </a:r>
+            <a:r>
+              <a:rPr lang="en-TW" dirty="0">
+                <a:ea typeface="DFKai-SB" panose="03000509000000000000" pitchFamily="49" charset="-120"/>
+              </a:rPr>
+              <a:t>使用者認證、</a:t>
+            </a:r>
+            <a:r>
+              <a:rPr lang="zh-TW" altLang="en-US" dirty="0">
+                <a:ea typeface="DFKai-SB" panose="03000509000000000000" pitchFamily="49" charset="-120"/>
+              </a:rPr>
+              <a:t>授權 整合測試規劃</a:t>
+            </a:r>
+            <a:endParaRPr lang="en-TW" dirty="0">
+              <a:ea typeface="DFKai-SB" panose="03000509000000000000" pitchFamily="49" charset="-120"/>
+            </a:endParaRPr>
+          </a:p>
+        </p:txBody>
+      </p:sp>
+      <p:sp>
+        <p:nvSpPr>
+          <p:cNvPr id="3" name="Content Placeholder 2">
+            <a:extLst>
+              <a:ext uri="{FF2B5EF4-FFF2-40B4-BE49-F238E27FC236}">
+                <a16:creationId xmlns:a16="http://schemas.microsoft.com/office/drawing/2014/main" id="{D0015E2B-A1CC-6447-9536-C7CF704646DA}"/>
+              </a:ext>
+            </a:extLst>
+          </p:cNvPr>
+          <p:cNvSpPr>
+            <a:spLocks noGrp="1"/>
+          </p:cNvSpPr>
+          <p:nvPr>
+            <p:ph idx="1"/>
+          </p:nvPr>
+        </p:nvSpPr>
+        <p:spPr/>
+        <p:txBody>
+          <a:bodyPr/>
+          <a:lstStyle/>
+          <a:p>
+            <a:endParaRPr lang="en-TW" dirty="0"/>
+          </a:p>
+        </p:txBody>
+      </p:sp>
+    </p:spTree>
+    <p:extLst>
+      <p:ext uri="{BB962C8B-B14F-4D97-AF65-F5344CB8AC3E}">
+        <p14:creationId xmlns:p14="http://schemas.microsoft.com/office/powerpoint/2010/main" val="1090378526"/>
       </p:ext>
     </p:extLst>
   </p:cSld>

</xml_diff>